<commit_message>
oppdatert figur faretebng mot faregrad
</commit_message>
<xml_diff>
--- a/products/Faretegn mot faregrad 2014-15.pptx
+++ b/products/Faretegn mot faregrad 2014-15.pptx
@@ -7,6 +7,7 @@
   <p:sldIdLst>
     <p:sldId id="256" r:id="rId2"/>
     <p:sldId id="257" r:id="rId3"/>
+    <p:sldId id="258" r:id="rId4"/>
   </p:sldIdLst>
   <p:sldSz cx="9144000" cy="6858000" type="screen4x3"/>
   <p:notesSz cx="6858000" cy="9144000"/>
@@ -105,6 +106,22 @@
       </a:defRPr>
     </a:lvl9pPr>
   </p:defaultTextStyle>
+  <p:extLst>
+    <p:ext uri="{EFAFB233-063F-42B5-8137-9DF3F51BA10A}">
+      <p15:sldGuideLst xmlns:p15="http://schemas.microsoft.com/office/powerpoint/2012/main">
+        <p15:guide id="1" orient="horz" pos="2160">
+          <p15:clr>
+            <a:srgbClr val="A4A3A4"/>
+          </p15:clr>
+        </p15:guide>
+        <p15:guide id="2" pos="2880">
+          <p15:clr>
+            <a:srgbClr val="A4A3A4"/>
+          </p15:clr>
+        </p15:guide>
+      </p15:sldGuideLst>
+    </p:ext>
+  </p:extLst>
 </p:presentation>
 </file>
 
@@ -289,7 +306,7 @@
           <a:p>
             <a:fld id="{BE9348B3-066C-B648-9713-28146D6B1825}" type="datetimeFigureOut">
               <a:rPr lang="nb-NO" smtClean="0"/>
-              <a:t>28/11/15</a:t>
+              <a:t>30.11.2015</a:t>
             </a:fld>
             <a:endParaRPr lang="nb-NO"/>
           </a:p>
@@ -459,7 +476,7 @@
           <a:p>
             <a:fld id="{BE9348B3-066C-B648-9713-28146D6B1825}" type="datetimeFigureOut">
               <a:rPr lang="nb-NO" smtClean="0"/>
-              <a:t>28/11/15</a:t>
+              <a:t>30.11.2015</a:t>
             </a:fld>
             <a:endParaRPr lang="nb-NO"/>
           </a:p>
@@ -639,7 +656,7 @@
           <a:p>
             <a:fld id="{BE9348B3-066C-B648-9713-28146D6B1825}" type="datetimeFigureOut">
               <a:rPr lang="nb-NO" smtClean="0"/>
-              <a:t>28/11/15</a:t>
+              <a:t>30.11.2015</a:t>
             </a:fld>
             <a:endParaRPr lang="nb-NO"/>
           </a:p>
@@ -809,7 +826,7 @@
           <a:p>
             <a:fld id="{BE9348B3-066C-B648-9713-28146D6B1825}" type="datetimeFigureOut">
               <a:rPr lang="nb-NO" smtClean="0"/>
-              <a:t>28/11/15</a:t>
+              <a:t>30.11.2015</a:t>
             </a:fld>
             <a:endParaRPr lang="nb-NO"/>
           </a:p>
@@ -1055,7 +1072,7 @@
           <a:p>
             <a:fld id="{BE9348B3-066C-B648-9713-28146D6B1825}" type="datetimeFigureOut">
               <a:rPr lang="nb-NO" smtClean="0"/>
-              <a:t>28/11/15</a:t>
+              <a:t>30.11.2015</a:t>
             </a:fld>
             <a:endParaRPr lang="nb-NO"/>
           </a:p>
@@ -1343,7 +1360,7 @@
           <a:p>
             <a:fld id="{BE9348B3-066C-B648-9713-28146D6B1825}" type="datetimeFigureOut">
               <a:rPr lang="nb-NO" smtClean="0"/>
-              <a:t>28/11/15</a:t>
+              <a:t>30.11.2015</a:t>
             </a:fld>
             <a:endParaRPr lang="nb-NO"/>
           </a:p>
@@ -1765,7 +1782,7 @@
           <a:p>
             <a:fld id="{BE9348B3-066C-B648-9713-28146D6B1825}" type="datetimeFigureOut">
               <a:rPr lang="nb-NO" smtClean="0"/>
-              <a:t>28/11/15</a:t>
+              <a:t>30.11.2015</a:t>
             </a:fld>
             <a:endParaRPr lang="nb-NO"/>
           </a:p>
@@ -1883,7 +1900,7 @@
           <a:p>
             <a:fld id="{BE9348B3-066C-B648-9713-28146D6B1825}" type="datetimeFigureOut">
               <a:rPr lang="nb-NO" smtClean="0"/>
-              <a:t>28/11/15</a:t>
+              <a:t>30.11.2015</a:t>
             </a:fld>
             <a:endParaRPr lang="nb-NO"/>
           </a:p>
@@ -1978,7 +1995,7 @@
           <a:p>
             <a:fld id="{BE9348B3-066C-B648-9713-28146D6B1825}" type="datetimeFigureOut">
               <a:rPr lang="nb-NO" smtClean="0"/>
-              <a:t>28/11/15</a:t>
+              <a:t>30.11.2015</a:t>
             </a:fld>
             <a:endParaRPr lang="nb-NO"/>
           </a:p>
@@ -2255,7 +2272,7 @@
           <a:p>
             <a:fld id="{BE9348B3-066C-B648-9713-28146D6B1825}" type="datetimeFigureOut">
               <a:rPr lang="nb-NO" smtClean="0"/>
-              <a:t>28/11/15</a:t>
+              <a:t>30.11.2015</a:t>
             </a:fld>
             <a:endParaRPr lang="nb-NO"/>
           </a:p>
@@ -2508,7 +2525,7 @@
           <a:p>
             <a:fld id="{BE9348B3-066C-B648-9713-28146D6B1825}" type="datetimeFigureOut">
               <a:rPr lang="nb-NO" smtClean="0"/>
-              <a:t>28/11/15</a:t>
+              <a:t>30.11.2015</a:t>
             </a:fld>
             <a:endParaRPr lang="nb-NO"/>
           </a:p>
@@ -2721,7 +2738,7 @@
           <a:p>
             <a:fld id="{BE9348B3-066C-B648-9713-28146D6B1825}" type="datetimeFigureOut">
               <a:rPr lang="nb-NO" smtClean="0"/>
-              <a:t>28/11/15</a:t>
+              <a:t>30.11.2015</a:t>
             </a:fld>
             <a:endParaRPr lang="nb-NO"/>
           </a:p>
@@ -3201,197 +3218,182 @@
               </a:ext>
             </a:extLst>
           </a:blip>
-          <a:srcRect l="4339" t="4233" b="3198"/>
+          <a:srcRect l="4339" t="5234" b="12849"/>
           <a:stretch/>
         </p:blipFill>
         <p:spPr>
           <a:xfrm>
-            <a:off x="0" y="0"/>
-            <a:ext cx="7087064" cy="6858000"/>
+            <a:off x="480060" y="0"/>
+            <a:ext cx="8008620" cy="6858000"/>
           </a:xfrm>
           <a:prstGeom prst="rect">
             <a:avLst/>
           </a:prstGeom>
         </p:spPr>
       </p:pic>
-      <p:sp>
-        <p:nvSpPr>
-          <p:cNvPr id="8" name="Rektangel 7"/>
-          <p:cNvSpPr/>
-          <p:nvPr/>
-        </p:nvSpPr>
-        <p:spPr>
-          <a:xfrm>
-            <a:off x="4711644" y="3684778"/>
-            <a:ext cx="4432356" cy="3173221"/>
-          </a:xfrm>
-          <a:prstGeom prst="rect">
-            <a:avLst/>
-          </a:prstGeom>
-          <a:solidFill>
-            <a:schemeClr val="bg1">
-              <a:lumMod val="85000"/>
-            </a:schemeClr>
-          </a:solidFill>
-          <a:ln>
-            <a:noFill/>
-          </a:ln>
-        </p:spPr>
-        <p:style>
-          <a:lnRef idx="1">
-            <a:schemeClr val="accent1"/>
-          </a:lnRef>
-          <a:fillRef idx="3">
-            <a:schemeClr val="accent1"/>
-          </a:fillRef>
-          <a:effectRef idx="2">
-            <a:schemeClr val="accent1"/>
-          </a:effectRef>
-          <a:fontRef idx="minor">
-            <a:schemeClr val="lt1"/>
-          </a:fontRef>
-        </p:style>
-        <p:txBody>
-          <a:bodyPr rtlCol="0" anchor="ctr"/>
-          <a:lstStyle/>
-          <a:p>
-            <a:pPr algn="ctr"/>
-            <a:endParaRPr lang="nb-NO"/>
-          </a:p>
-        </p:txBody>
-      </p:sp>
-      <p:sp>
-        <p:nvSpPr>
-          <p:cNvPr id="5" name="Plassholder for innhold 2"/>
-          <p:cNvSpPr>
-            <a:spLocks noGrp="1"/>
-          </p:cNvSpPr>
-          <p:nvPr>
-            <p:ph idx="1"/>
-          </p:nvPr>
-        </p:nvSpPr>
-        <p:spPr>
-          <a:xfrm>
-            <a:off x="4923314" y="3778858"/>
-            <a:ext cx="4076632" cy="2953703"/>
-          </a:xfrm>
-        </p:spPr>
-        <p:txBody>
-          <a:bodyPr>
-            <a:normAutofit/>
-          </a:bodyPr>
-          <a:lstStyle/>
-          <a:p>
-            <a:pPr marL="0" indent="0">
-              <a:buNone/>
-            </a:pPr>
-            <a:r>
-              <a:rPr lang="nb-NO" sz="1000" b="1" dirty="0" smtClean="0"/>
-              <a:t>Om figuren:</a:t>
-            </a:r>
-          </a:p>
-          <a:p>
-            <a:r>
-              <a:rPr lang="nb-NO" sz="1000" dirty="0" smtClean="0"/>
-              <a:t>Figuren er normert. Den viser fordelingen innen hver faregrad.</a:t>
-            </a:r>
-          </a:p>
-          <a:p>
-            <a:r>
-              <a:rPr lang="nb-NO" sz="1000" dirty="0" smtClean="0"/>
-              <a:t>Legg merke til store variasjoner mellom antall observasjoner pr faregrad og antall dager varslet med ulike faregrader.</a:t>
-            </a:r>
-          </a:p>
-          <a:p>
-            <a:pPr marL="0" indent="0">
-              <a:buNone/>
-            </a:pPr>
-            <a:endParaRPr lang="nb-NO" sz="1000" dirty="0" smtClean="0"/>
-          </a:p>
-          <a:p>
-            <a:pPr marL="0" indent="0">
-              <a:buNone/>
-            </a:pPr>
-            <a:r>
-              <a:rPr lang="nb-NO" sz="1000" b="1" dirty="0" smtClean="0"/>
-              <a:t>Kommentarer:</a:t>
-            </a:r>
-          </a:p>
-          <a:p>
-            <a:r>
-              <a:rPr lang="nb-NO" sz="1000" dirty="0" smtClean="0"/>
-              <a:t>”Ingen faretegn” avtar ved høyere faregrad.</a:t>
-            </a:r>
-          </a:p>
-          <a:p>
-            <a:r>
-              <a:rPr lang="nb-NO" sz="1000" dirty="0" smtClean="0"/>
-              <a:t>”Drønn” og ”ferske sprekker” forekommer oftere på </a:t>
-            </a:r>
-            <a:r>
-              <a:rPr lang="nb-NO" sz="1000" dirty="0" err="1" smtClean="0"/>
-              <a:t>fg</a:t>
-            </a:r>
-            <a:r>
-              <a:rPr lang="nb-NO" sz="1000" dirty="0" smtClean="0"/>
-              <a:t> 2 og 3 en på </a:t>
-            </a:r>
-            <a:r>
-              <a:rPr lang="nb-NO" sz="1000" dirty="0" err="1" smtClean="0"/>
-              <a:t>fg</a:t>
-            </a:r>
-            <a:r>
-              <a:rPr lang="nb-NO" sz="1000" dirty="0" smtClean="0"/>
-              <a:t> 1 og 4.</a:t>
-            </a:r>
-          </a:p>
-          <a:p>
-            <a:r>
-              <a:rPr lang="nb-NO" sz="1000" dirty="0" smtClean="0"/>
-              <a:t>”Ferske skred” utgjør ikke en stor andel på noen faregrader</a:t>
-            </a:r>
-          </a:p>
-          <a:p>
-            <a:r>
-              <a:rPr lang="nb-NO" sz="1000" dirty="0" smtClean="0"/>
-              <a:t>Interessant hvordan andelen ”fersk vindtransportert snø” ikke endrer mye på seg fra faregrad til faregrad.</a:t>
-            </a:r>
-          </a:p>
-          <a:p>
-            <a:pPr marL="0" indent="0">
-              <a:buNone/>
-            </a:pPr>
-            <a:endParaRPr lang="nb-NO" sz="1000" dirty="0" smtClean="0"/>
-          </a:p>
-          <a:p>
-            <a:pPr marL="0" indent="0">
-              <a:buNone/>
-            </a:pPr>
-            <a:r>
-              <a:rPr lang="nb-NO" sz="1000" b="1" dirty="0" smtClean="0"/>
-              <a:t>Læring?:</a:t>
-            </a:r>
-            <a:endParaRPr lang="nb-NO" sz="1000" b="1" dirty="0"/>
-          </a:p>
-          <a:p>
-            <a:r>
-              <a:rPr lang="nb-NO" sz="1000" dirty="0" smtClean="0"/>
-              <a:t>Savner vi faretegnet: ”Svakt lag med kantkorn”?</a:t>
-            </a:r>
-          </a:p>
-          <a:p>
-            <a:r>
-              <a:rPr lang="nb-NO" sz="1000" dirty="0" smtClean="0"/>
-              <a:t>Er observatørene flinke til å observere ”ingen faretegn”?</a:t>
-            </a:r>
-            <a:endParaRPr lang="nb-NO" sz="1000" dirty="0"/>
-          </a:p>
-        </p:txBody>
-      </p:sp>
     </p:spTree>
     <p:extLst>
       <p:ext uri="{BB962C8B-B14F-4D97-AF65-F5344CB8AC3E}">
         <p14:creationId xmlns:p14="http://schemas.microsoft.com/office/powerpoint/2010/main" val="778792196"/>
+      </p:ext>
+    </p:extLst>
+  </p:cSld>
+  <p:clrMapOvr>
+    <a:masterClrMapping/>
+  </p:clrMapOvr>
+</p:sld>
+</file>
+
+<file path=ppt/slides/slide3.xml><?xml version="1.0" encoding="utf-8"?>
+<p:sld xmlns:a="http://schemas.openxmlformats.org/drawingml/2006/main" xmlns:r="http://schemas.openxmlformats.org/officeDocument/2006/relationships" xmlns:p="http://schemas.openxmlformats.org/presentationml/2006/main">
+  <p:cSld>
+    <p:spTree>
+      <p:nvGrpSpPr>
+        <p:cNvPr id="1" name=""/>
+        <p:cNvGrpSpPr/>
+        <p:nvPr/>
+      </p:nvGrpSpPr>
+      <p:grpSpPr>
+        <a:xfrm>
+          <a:off x="0" y="0"/>
+          <a:ext cx="0" cy="0"/>
+          <a:chOff x="0" y="0"/>
+          <a:chExt cx="0" cy="0"/>
+        </a:xfrm>
+      </p:grpSpPr>
+      <p:sp>
+        <p:nvSpPr>
+          <p:cNvPr id="3" name="Plassholder for innhold 2"/>
+          <p:cNvSpPr>
+            <a:spLocks noGrp="1"/>
+          </p:cNvSpPr>
+          <p:nvPr>
+            <p:ph idx="1"/>
+          </p:nvPr>
+        </p:nvSpPr>
+        <p:spPr>
+          <a:xfrm>
+            <a:off x="457200" y="640080"/>
+            <a:ext cx="8229600" cy="5486083"/>
+          </a:xfrm>
+        </p:spPr>
+        <p:txBody>
+          <a:bodyPr>
+            <a:normAutofit fontScale="70000" lnSpcReduction="20000"/>
+          </a:bodyPr>
+          <a:lstStyle/>
+          <a:p>
+            <a:pPr marL="0" indent="0">
+              <a:buNone/>
+            </a:pPr>
+            <a:r>
+              <a:rPr lang="nb-NO" b="1" dirty="0"/>
+              <a:t>Om figuren:</a:t>
+            </a:r>
+          </a:p>
+          <a:p>
+            <a:r>
+              <a:rPr lang="nb-NO" dirty="0"/>
+              <a:t>Figuren er normert. Den viser fordelingen innen hver faregrad.</a:t>
+            </a:r>
+          </a:p>
+          <a:p>
+            <a:r>
+              <a:rPr lang="nb-NO" dirty="0"/>
+              <a:t>Legg merke til store variasjoner mellom antall observasjoner pr faregrad og antall dager varslet med ulike faregrader.</a:t>
+            </a:r>
+          </a:p>
+          <a:p>
+            <a:pPr marL="0" indent="0">
+              <a:buNone/>
+            </a:pPr>
+            <a:endParaRPr lang="nb-NO" dirty="0"/>
+          </a:p>
+          <a:p>
+            <a:pPr marL="0" indent="0">
+              <a:buNone/>
+            </a:pPr>
+            <a:r>
+              <a:rPr lang="nb-NO" b="1" dirty="0"/>
+              <a:t>Kommentarer:</a:t>
+            </a:r>
+          </a:p>
+          <a:p>
+            <a:r>
+              <a:rPr lang="nb-NO" dirty="0"/>
+              <a:t>”Ingen faretegn” avtar ved høyere faregrad.</a:t>
+            </a:r>
+          </a:p>
+          <a:p>
+            <a:r>
+              <a:rPr lang="nb-NO" dirty="0"/>
+              <a:t>”Drønn” og ”ferske sprekker” forekommer oftere på </a:t>
+            </a:r>
+            <a:r>
+              <a:rPr lang="nb-NO" dirty="0" err="1"/>
+              <a:t>fg</a:t>
+            </a:r>
+            <a:r>
+              <a:rPr lang="nb-NO" dirty="0"/>
+              <a:t> 2 og 3 en på </a:t>
+            </a:r>
+            <a:r>
+              <a:rPr lang="nb-NO" dirty="0" err="1"/>
+              <a:t>fg</a:t>
+            </a:r>
+            <a:r>
+              <a:rPr lang="nb-NO" dirty="0"/>
+              <a:t> 1 og 4.</a:t>
+            </a:r>
+          </a:p>
+          <a:p>
+            <a:r>
+              <a:rPr lang="nb-NO" dirty="0"/>
+              <a:t>”Ferske skred” utgjør ikke en stor andel på noen faregrader</a:t>
+            </a:r>
+          </a:p>
+          <a:p>
+            <a:r>
+              <a:rPr lang="nb-NO" dirty="0"/>
+              <a:t>Interessant hvordan andelen ”fersk vindtransportert snø” ikke endrer mye på seg fra faregrad til faregrad.</a:t>
+            </a:r>
+          </a:p>
+          <a:p>
+            <a:pPr marL="0" indent="0">
+              <a:buNone/>
+            </a:pPr>
+            <a:endParaRPr lang="nb-NO" dirty="0"/>
+          </a:p>
+          <a:p>
+            <a:pPr marL="0" indent="0">
+              <a:buNone/>
+            </a:pPr>
+            <a:r>
+              <a:rPr lang="nb-NO" b="1" dirty="0"/>
+              <a:t>Læring?:</a:t>
+            </a:r>
+          </a:p>
+          <a:p>
+            <a:r>
+              <a:rPr lang="nb-NO" dirty="0"/>
+              <a:t>Savner vi faretegnet: ”Svakt lag med kantkorn”?</a:t>
+            </a:r>
+          </a:p>
+          <a:p>
+            <a:r>
+              <a:rPr lang="nb-NO" dirty="0"/>
+              <a:t>Er observatørene flinke til å observere ”ingen faretegn”?</a:t>
+            </a:r>
+          </a:p>
+          <a:p>
+            <a:endParaRPr lang="nb-NO" dirty="0"/>
+          </a:p>
+        </p:txBody>
+      </p:sp>
+    </p:spTree>
+    <p:extLst>
+      <p:ext uri="{BB962C8B-B14F-4D97-AF65-F5344CB8AC3E}">
+        <p14:creationId xmlns:p14="http://schemas.microsoft.com/office/powerpoint/2010/main" val="1001943148"/>
       </p:ext>
     </p:extLst>
   </p:cSld>

</xml_diff>